<commit_message>
Update the code document and added the communication manager.
</commit_message>
<xml_diff>
--- a/doc/Cluster Service Health Monitor_DesignDoc.pptx
+++ b/doc/Cluster Service Health Monitor_DesignDoc.pptx
@@ -205,7 +205,7 @@
           <a:p>
             <a:fld id="{E122AC02-B92E-41D9-886A-21087C8DA947}" type="datetimeFigureOut">
               <a:rPr lang="en-SG" smtClean="0"/>
-              <a:t>23/3/2023</a:t>
+              <a:t>27/3/2023</a:t>
             </a:fld>
             <a:endParaRPr lang="en-SG"/>
           </a:p>
@@ -1126,7 +1126,7 @@
           <a:p>
             <a:fld id="{0D7D87DA-52D1-4FCF-86E4-E01EA409C95E}" type="datetimeFigureOut">
               <a:rPr lang="en-SG" smtClean="0"/>
-              <a:t>23/3/2023</a:t>
+              <a:t>27/3/2023</a:t>
             </a:fld>
             <a:endParaRPr lang="en-SG"/>
           </a:p>
@@ -1326,7 +1326,7 @@
           <a:p>
             <a:fld id="{0D7D87DA-52D1-4FCF-86E4-E01EA409C95E}" type="datetimeFigureOut">
               <a:rPr lang="en-SG" smtClean="0"/>
-              <a:t>23/3/2023</a:t>
+              <a:t>27/3/2023</a:t>
             </a:fld>
             <a:endParaRPr lang="en-SG"/>
           </a:p>
@@ -1536,7 +1536,7 @@
           <a:p>
             <a:fld id="{0D7D87DA-52D1-4FCF-86E4-E01EA409C95E}" type="datetimeFigureOut">
               <a:rPr lang="en-SG" smtClean="0"/>
-              <a:t>23/3/2023</a:t>
+              <a:t>27/3/2023</a:t>
             </a:fld>
             <a:endParaRPr lang="en-SG"/>
           </a:p>
@@ -1736,7 +1736,7 @@
           <a:p>
             <a:fld id="{0D7D87DA-52D1-4FCF-86E4-E01EA409C95E}" type="datetimeFigureOut">
               <a:rPr lang="en-SG" smtClean="0"/>
-              <a:t>23/3/2023</a:t>
+              <a:t>27/3/2023</a:t>
             </a:fld>
             <a:endParaRPr lang="en-SG"/>
           </a:p>
@@ -2012,7 +2012,7 @@
           <a:p>
             <a:fld id="{0D7D87DA-52D1-4FCF-86E4-E01EA409C95E}" type="datetimeFigureOut">
               <a:rPr lang="en-SG" smtClean="0"/>
-              <a:t>23/3/2023</a:t>
+              <a:t>27/3/2023</a:t>
             </a:fld>
             <a:endParaRPr lang="en-SG"/>
           </a:p>
@@ -2280,7 +2280,7 @@
           <a:p>
             <a:fld id="{0D7D87DA-52D1-4FCF-86E4-E01EA409C95E}" type="datetimeFigureOut">
               <a:rPr lang="en-SG" smtClean="0"/>
-              <a:t>23/3/2023</a:t>
+              <a:t>27/3/2023</a:t>
             </a:fld>
             <a:endParaRPr lang="en-SG"/>
           </a:p>
@@ -2695,7 +2695,7 @@
           <a:p>
             <a:fld id="{0D7D87DA-52D1-4FCF-86E4-E01EA409C95E}" type="datetimeFigureOut">
               <a:rPr lang="en-SG" smtClean="0"/>
-              <a:t>23/3/2023</a:t>
+              <a:t>27/3/2023</a:t>
             </a:fld>
             <a:endParaRPr lang="en-SG"/>
           </a:p>
@@ -2837,7 +2837,7 @@
           <a:p>
             <a:fld id="{0D7D87DA-52D1-4FCF-86E4-E01EA409C95E}" type="datetimeFigureOut">
               <a:rPr lang="en-SG" smtClean="0"/>
-              <a:t>23/3/2023</a:t>
+              <a:t>27/3/2023</a:t>
             </a:fld>
             <a:endParaRPr lang="en-SG"/>
           </a:p>
@@ -2950,7 +2950,7 @@
           <a:p>
             <a:fld id="{0D7D87DA-52D1-4FCF-86E4-E01EA409C95E}" type="datetimeFigureOut">
               <a:rPr lang="en-SG" smtClean="0"/>
-              <a:t>23/3/2023</a:t>
+              <a:t>27/3/2023</a:t>
             </a:fld>
             <a:endParaRPr lang="en-SG"/>
           </a:p>
@@ -3263,7 +3263,7 @@
           <a:p>
             <a:fld id="{0D7D87DA-52D1-4FCF-86E4-E01EA409C95E}" type="datetimeFigureOut">
               <a:rPr lang="en-SG" smtClean="0"/>
-              <a:t>23/3/2023</a:t>
+              <a:t>27/3/2023</a:t>
             </a:fld>
             <a:endParaRPr lang="en-SG"/>
           </a:p>
@@ -3552,7 +3552,7 @@
           <a:p>
             <a:fld id="{0D7D87DA-52D1-4FCF-86E4-E01EA409C95E}" type="datetimeFigureOut">
               <a:rPr lang="en-SG" smtClean="0"/>
-              <a:t>23/3/2023</a:t>
+              <a:t>27/3/2023</a:t>
             </a:fld>
             <a:endParaRPr lang="en-SG"/>
           </a:p>
@@ -3795,7 +3795,7 @@
           <a:p>
             <a:fld id="{0D7D87DA-52D1-4FCF-86E4-E01EA409C95E}" type="datetimeFigureOut">
               <a:rPr lang="en-SG" smtClean="0"/>
-              <a:t>23/3/2023</a:t>
+              <a:t>27/3/2023</a:t>
             </a:fld>
             <a:endParaRPr lang="en-SG"/>
           </a:p>
@@ -5880,15 +5880,15 @@
             <a:pPr algn="just"/>
             <a:r>
               <a:rPr lang="en-US" sz="1600" b="1" dirty="0"/>
-              <a:t>Service Prober Repository is a prober module lib to provide the service / program function check function. The prober function can be categorized to three parts: local service probers, children agent prober and network </a:t>
-            </a:r>
-            <a:r>
-              <a:rPr lang="en-US" sz="1600" b="1" dirty="0" err="1"/>
-              <a:t>serice</a:t>
+              <a:t>Service Prober Repository is a prober module lib to provide the service / program function check function. The prober function can be categorized to three parts: local service probers, children agent prober and </a:t>
+            </a:r>
+            <a:r>
+              <a:rPr lang="en-US" sz="1600" b="1"/>
+              <a:t>network service probers</a:t>
             </a:r>
             <a:r>
               <a:rPr lang="en-US" sz="1600" b="1" dirty="0"/>
-              <a:t> probers.</a:t>
+              <a:t>.</a:t>
             </a:r>
           </a:p>
         </p:txBody>

</xml_diff>